<commit_message>
Added Service state machine diagrams
</commit_message>
<xml_diff>
--- a/documents/CAHIER D’ANALYSES POUR LE GESTIONNAIRE DE TACHES.pptx
+++ b/documents/CAHIER D’ANALYSES POUR LE GESTIONNAIRE DE TACHES.pptx
@@ -20,9 +20,8 @@
     <p:sldId id="268" r:id="rId14"/>
     <p:sldId id="269" r:id="rId15"/>
     <p:sldId id="270" r:id="rId16"/>
-    <p:sldId id="271" r:id="rId17"/>
-    <p:sldId id="272" r:id="rId18"/>
-    <p:sldId id="273" r:id="rId19"/>
+    <p:sldId id="273" r:id="rId17"/>
+    <p:sldId id="274" r:id="rId18"/>
   </p:sldIdLst>
   <p:sldSz cx="12192000" cy="6858000"/>
   <p:notesSz cx="6858000" cy="9144000"/>
@@ -121,6 +120,11 @@
       </a:defRPr>
     </a:lvl9pPr>
   </p:defaultTextStyle>
+  <p:extLst>
+    <p:ext uri="{EFAFB233-063F-42B5-8137-9DF3F51BA10A}">
+      <p15:sldGuideLst xmlns:p15="http://schemas.microsoft.com/office/powerpoint/2012/main"/>
+    </p:ext>
+  </p:extLst>
 </p:presentation>
 </file>
 
@@ -3340,69 +3344,336 @@
       </p:grpSpPr>
       <p:sp>
         <p:nvSpPr>
-          <p:cNvPr id="2" name="Title 1">
-            <a:extLst>
-              <a:ext uri="{FF2B5EF4-FFF2-40B4-BE49-F238E27FC236}">
-                <a16:creationId xmlns:a16="http://schemas.microsoft.com/office/drawing/2014/main" id="{9184EB7D-964E-B7A7-2126-9D14713DE857}"/>
-              </a:ext>
-            </a:extLst>
-          </p:cNvPr>
-          <p:cNvSpPr>
-            <a:spLocks noGrp="1"/>
-          </p:cNvSpPr>
-          <p:nvPr>
-            <p:ph type="ctrTitle"/>
-          </p:nvPr>
-        </p:nvSpPr>
-        <p:spPr/>
-        <p:txBody>
-          <a:bodyPr/>
-          <a:lstStyle/>
-          <a:p>
-            <a:r>
-              <a:rPr lang="en-US" dirty="0"/>
-              <a:t>CAHIER D’ANALYSE POUR LE GESTIONNAIRE DE TACHES</a:t>
-            </a:r>
-          </a:p>
-        </p:txBody>
-      </p:sp>
-      <p:sp>
-        <p:nvSpPr>
-          <p:cNvPr id="3" name="Subtitle 2">
-            <a:extLst>
-              <a:ext uri="{FF2B5EF4-FFF2-40B4-BE49-F238E27FC236}">
-                <a16:creationId xmlns:a16="http://schemas.microsoft.com/office/drawing/2014/main" id="{772812D5-0210-687C-E8D9-D7437D3E5BB4}"/>
-              </a:ext>
-            </a:extLst>
-          </p:cNvPr>
-          <p:cNvSpPr>
-            <a:spLocks noGrp="1"/>
-          </p:cNvSpPr>
-          <p:nvPr>
-            <p:ph type="subTitle" idx="1"/>
-          </p:nvPr>
-        </p:nvSpPr>
-        <p:spPr/>
-        <p:txBody>
-          <a:bodyPr/>
-          <a:lstStyle/>
-          <a:p>
-            <a:r>
-              <a:rPr lang="en-US" dirty="0" err="1"/>
-              <a:t>Presente</a:t>
-            </a:r>
-            <a:r>
-              <a:rPr lang="en-US" dirty="0"/>
-              <a:t> par MOLO ANNE MARIE, NDOCK </a:t>
-            </a:r>
-            <a:r>
-              <a:rPr lang="en-US" dirty="0" err="1"/>
-              <a:t>NDOCK</a:t>
-            </a:r>
-            <a:r>
-              <a:rPr lang="en-US" dirty="0"/>
-              <a:t> CAREL AND NGUH PRINCE SUH</a:t>
-            </a:r>
+          <p:cNvPr id="8" name="TextBox 6">
+            <a:extLst>
+              <a:ext uri="{FF2B5EF4-FFF2-40B4-BE49-F238E27FC236}">
+                <a16:creationId xmlns:a16="http://schemas.microsoft.com/office/drawing/2014/main" id="{A7F2B963-9EC0-E4F0-DBC6-16411D0FD964}"/>
+              </a:ext>
+            </a:extLst>
+          </p:cNvPr>
+          <p:cNvSpPr txBox="1"/>
+          <p:nvPr/>
+        </p:nvSpPr>
+        <p:spPr>
+          <a:xfrm>
+            <a:off x="2301240" y="2030730"/>
+            <a:ext cx="7269480" cy="1968296"/>
+          </a:xfrm>
+          <a:prstGeom prst="rect">
+            <a:avLst/>
+          </a:prstGeom>
+        </p:spPr>
+        <p:txBody>
+          <a:bodyPr wrap="square" lIns="0" tIns="0" rIns="0" bIns="0" rtlCol="0" anchor="t">
+            <a:spAutoFit/>
+          </a:bodyPr>
+          <a:lstStyle/>
+          <a:p>
+            <a:pPr marL="0" marR="0" algn="ctr">
+              <a:lnSpc>
+                <a:spcPts val="5260"/>
+              </a:lnSpc>
+              <a:spcBef>
+                <a:spcPts val="600"/>
+              </a:spcBef>
+              <a:spcAft>
+                <a:spcPts val="600"/>
+              </a:spcAft>
+            </a:pPr>
+            <a:r>
+              <a:rPr lang="fr-FR" sz="2800" kern="1200" dirty="0">
+                <a:solidFill>
+                  <a:srgbClr val="2F5496"/>
+                </a:solidFill>
+                <a:effectLst/>
+                <a:latin typeface="Poppins SemiBold" panose="00000700000000000000" pitchFamily="2" charset="0"/>
+                <a:ea typeface="Calibri" panose="020F0502020204030204" pitchFamily="34" charset="0"/>
+                <a:cs typeface="Times New Roman" panose="02020603050405020304" pitchFamily="18" charset="0"/>
+              </a:rPr>
+              <a:t>CAHIER D’ANALYSES POUR UN GESTIONNAIRE </a:t>
+            </a:r>
+            <a:r>
+              <a:rPr lang="fr-FR" sz="2800" kern="1200" dirty="0">
+                <a:solidFill>
+                  <a:srgbClr val="5A78AC"/>
+                </a:solidFill>
+                <a:effectLst/>
+                <a:latin typeface="Poppins SemiBold" panose="00000700000000000000" pitchFamily="2" charset="0"/>
+                <a:ea typeface="Calibri" panose="020F0502020204030204" pitchFamily="34" charset="0"/>
+                <a:cs typeface="Times New Roman" panose="02020603050405020304" pitchFamily="18" charset="0"/>
+              </a:rPr>
+              <a:t>DE</a:t>
+            </a:r>
+            <a:r>
+              <a:rPr lang="fr-FR" sz="2800" kern="1200" dirty="0">
+                <a:solidFill>
+                  <a:srgbClr val="2F5496"/>
+                </a:solidFill>
+                <a:effectLst/>
+                <a:latin typeface="Poppins SemiBold" panose="00000700000000000000" pitchFamily="2" charset="0"/>
+                <a:ea typeface="Calibri" panose="020F0502020204030204" pitchFamily="34" charset="0"/>
+                <a:cs typeface="Times New Roman" panose="02020603050405020304" pitchFamily="18" charset="0"/>
+              </a:rPr>
+              <a:t> TACHES AVEC UNE INTERFACE GRAPHIQUE</a:t>
+            </a:r>
+            <a:endParaRPr lang="en-US" sz="1100" dirty="0">
+              <a:effectLst/>
+              <a:latin typeface="Calibri" panose="020F0502020204030204" pitchFamily="34" charset="0"/>
+              <a:ea typeface="Calibri" panose="020F0502020204030204" pitchFamily="34" charset="0"/>
+              <a:cs typeface="Times New Roman" panose="02020603050405020304" pitchFamily="18" charset="0"/>
+            </a:endParaRPr>
+          </a:p>
+        </p:txBody>
+      </p:sp>
+      <p:sp>
+        <p:nvSpPr>
+          <p:cNvPr id="9" name="TextBox 8">
+            <a:extLst>
+              <a:ext uri="{FF2B5EF4-FFF2-40B4-BE49-F238E27FC236}">
+                <a16:creationId xmlns:a16="http://schemas.microsoft.com/office/drawing/2014/main" id="{24E787F8-6A1F-15AD-BF11-DC2DDDA87EA9}"/>
+              </a:ext>
+            </a:extLst>
+          </p:cNvPr>
+          <p:cNvSpPr txBox="1"/>
+          <p:nvPr/>
+        </p:nvSpPr>
+        <p:spPr>
+          <a:xfrm>
+            <a:off x="3214370" y="1490345"/>
+            <a:ext cx="5763260" cy="357505"/>
+          </a:xfrm>
+          <a:prstGeom prst="rect">
+            <a:avLst/>
+          </a:prstGeom>
+        </p:spPr>
+        <p:txBody>
+          <a:bodyPr wrap="square" lIns="0" tIns="0" rIns="0" bIns="0" rtlCol="0" anchor="t">
+            <a:spAutoFit/>
+          </a:bodyPr>
+          <a:lstStyle/>
+          <a:p>
+            <a:pPr marL="0" marR="0">
+              <a:lnSpc>
+                <a:spcPts val="2015"/>
+              </a:lnSpc>
+              <a:spcBef>
+                <a:spcPts val="0"/>
+              </a:spcBef>
+              <a:spcAft>
+                <a:spcPts val="800"/>
+              </a:spcAft>
+            </a:pPr>
+            <a:r>
+              <a:rPr lang="fr-FR" sz="1200" kern="1200" dirty="0">
+                <a:solidFill>
+                  <a:srgbClr val="2F5496"/>
+                </a:solidFill>
+                <a:effectLst/>
+                <a:latin typeface="Poppins SemiBold" panose="00000700000000000000" pitchFamily="2" charset="0"/>
+                <a:ea typeface="Calibri" panose="020F0502020204030204" pitchFamily="34" charset="0"/>
+                <a:cs typeface="Times New Roman" panose="02020603050405020304" pitchFamily="18" charset="0"/>
+              </a:rPr>
+              <a:t>Systèmes d’Exploitation Avances et Sécurité des Systèmes d’Exploitation</a:t>
+            </a:r>
+            <a:endParaRPr lang="en-US" sz="1100" dirty="0">
+              <a:effectLst/>
+              <a:latin typeface="Calibri" panose="020F0502020204030204" pitchFamily="34" charset="0"/>
+              <a:ea typeface="Calibri" panose="020F0502020204030204" pitchFamily="34" charset="0"/>
+              <a:cs typeface="Times New Roman" panose="02020603050405020304" pitchFamily="18" charset="0"/>
+            </a:endParaRPr>
+          </a:p>
+        </p:txBody>
+      </p:sp>
+      <p:sp>
+        <p:nvSpPr>
+          <p:cNvPr id="10" name="TextBox 8">
+            <a:extLst>
+              <a:ext uri="{FF2B5EF4-FFF2-40B4-BE49-F238E27FC236}">
+                <a16:creationId xmlns:a16="http://schemas.microsoft.com/office/drawing/2014/main" id="{BB92BFD9-E8D2-1392-B949-446BB88B2C84}"/>
+              </a:ext>
+            </a:extLst>
+          </p:cNvPr>
+          <p:cNvSpPr txBox="1"/>
+          <p:nvPr/>
+        </p:nvSpPr>
+        <p:spPr>
+          <a:xfrm>
+            <a:off x="1184910" y="5193982"/>
+            <a:ext cx="1819910" cy="953018"/>
+          </a:xfrm>
+          <a:prstGeom prst="rect">
+            <a:avLst/>
+          </a:prstGeom>
+        </p:spPr>
+        <p:txBody>
+          <a:bodyPr lIns="0" tIns="0" rIns="0" bIns="0" rtlCol="0" anchor="t">
+            <a:spAutoFit/>
+          </a:bodyPr>
+          <a:lstStyle/>
+          <a:p>
+            <a:pPr>
+              <a:lnSpc>
+                <a:spcPts val="2015"/>
+              </a:lnSpc>
+              <a:spcAft>
+                <a:spcPts val="800"/>
+              </a:spcAft>
+            </a:pPr>
+            <a:r>
+              <a:rPr lang="fr-FR" sz="1200" kern="1200" dirty="0">
+                <a:solidFill>
+                  <a:srgbClr val="2F5496"/>
+                </a:solidFill>
+                <a:effectLst/>
+                <a:latin typeface="Poppins SemiBold" panose="00000700000000000000" pitchFamily="2" charset="0"/>
+                <a:ea typeface="Calibri" panose="020F0502020204030204" pitchFamily="34" charset="0"/>
+                <a:cs typeface="Times New Roman" panose="02020603050405020304" pitchFamily="18" charset="0"/>
+              </a:rPr>
+              <a:t>MOLO ANNE</a:t>
+            </a:r>
+          </a:p>
+          <a:p>
+            <a:pPr>
+              <a:lnSpc>
+                <a:spcPts val="2015"/>
+              </a:lnSpc>
+              <a:spcAft>
+                <a:spcPts val="800"/>
+              </a:spcAft>
+            </a:pPr>
+            <a:r>
+              <a:rPr lang="fr-FR" sz="1200" kern="1200" dirty="0">
+                <a:solidFill>
+                  <a:srgbClr val="2F5496"/>
+                </a:solidFill>
+                <a:effectLst/>
+                <a:latin typeface="Poppins SemiBold" panose="00000700000000000000" pitchFamily="2" charset="0"/>
+                <a:ea typeface="Calibri" panose="020F0502020204030204" pitchFamily="34" charset="0"/>
+                <a:cs typeface="Times New Roman" panose="02020603050405020304" pitchFamily="18" charset="0"/>
+              </a:rPr>
+              <a:t>NDOCK CAREL</a:t>
+            </a:r>
+          </a:p>
+          <a:p>
+            <a:pPr marL="0" marR="0">
+              <a:lnSpc>
+                <a:spcPts val="2015"/>
+              </a:lnSpc>
+              <a:spcBef>
+                <a:spcPts val="0"/>
+              </a:spcBef>
+              <a:spcAft>
+                <a:spcPts val="800"/>
+              </a:spcAft>
+            </a:pPr>
+            <a:r>
+              <a:rPr lang="fr-FR" sz="1200" kern="1200" dirty="0">
+                <a:solidFill>
+                  <a:srgbClr val="2F5496"/>
+                </a:solidFill>
+                <a:effectLst/>
+                <a:latin typeface="Poppins SemiBold" panose="00000700000000000000" pitchFamily="2" charset="0"/>
+                <a:ea typeface="Calibri" panose="020F0502020204030204" pitchFamily="34" charset="0"/>
+                <a:cs typeface="Times New Roman" panose="02020603050405020304" pitchFamily="18" charset="0"/>
+              </a:rPr>
+              <a:t>NGUH PRINCE</a:t>
+            </a:r>
+            <a:endParaRPr lang="en-US" sz="1100" dirty="0">
+              <a:effectLst/>
+              <a:latin typeface="Calibri" panose="020F0502020204030204" pitchFamily="34" charset="0"/>
+              <a:ea typeface="Calibri" panose="020F0502020204030204" pitchFamily="34" charset="0"/>
+              <a:cs typeface="Times New Roman" panose="02020603050405020304" pitchFamily="18" charset="0"/>
+            </a:endParaRPr>
+          </a:p>
+        </p:txBody>
+      </p:sp>
+      <p:sp>
+        <p:nvSpPr>
+          <p:cNvPr id="11" name="TextBox 8">
+            <a:extLst>
+              <a:ext uri="{FF2B5EF4-FFF2-40B4-BE49-F238E27FC236}">
+                <a16:creationId xmlns:a16="http://schemas.microsoft.com/office/drawing/2014/main" id="{936A7EB8-12F1-B925-554B-25004CE2C584}"/>
+              </a:ext>
+            </a:extLst>
+          </p:cNvPr>
+          <p:cNvSpPr txBox="1"/>
+          <p:nvPr/>
+        </p:nvSpPr>
+        <p:spPr>
+          <a:xfrm>
+            <a:off x="8977630" y="5193982"/>
+            <a:ext cx="2029460" cy="715010"/>
+          </a:xfrm>
+          <a:prstGeom prst="rect">
+            <a:avLst/>
+          </a:prstGeom>
+        </p:spPr>
+        <p:txBody>
+          <a:bodyPr wrap="square" lIns="0" tIns="0" rIns="0" bIns="0" rtlCol="0" anchor="t">
+            <a:spAutoFit/>
+          </a:bodyPr>
+          <a:lstStyle/>
+          <a:p>
+            <a:pPr marL="0" marR="0">
+              <a:lnSpc>
+                <a:spcPts val="2015"/>
+              </a:lnSpc>
+              <a:spcBef>
+                <a:spcPts val="0"/>
+              </a:spcBef>
+              <a:spcAft>
+                <a:spcPts val="800"/>
+              </a:spcAft>
+            </a:pPr>
+            <a:r>
+              <a:rPr lang="fr-FR" sz="1200" kern="1200" dirty="0">
+                <a:solidFill>
+                  <a:srgbClr val="2F5496"/>
+                </a:solidFill>
+                <a:effectLst/>
+                <a:latin typeface="Poppins SemiBold" panose="00000700000000000000" pitchFamily="2" charset="0"/>
+                <a:ea typeface="Calibri" panose="020F0502020204030204" pitchFamily="34" charset="0"/>
+                <a:cs typeface="Times New Roman" panose="02020603050405020304" pitchFamily="18" charset="0"/>
+              </a:rPr>
+              <a:t>Mr. Emmanuel NGUIMBUS</a:t>
+            </a:r>
+            <a:endParaRPr lang="en-US" sz="1100" dirty="0">
+              <a:effectLst/>
+              <a:latin typeface="Calibri" panose="020F0502020204030204" pitchFamily="34" charset="0"/>
+              <a:ea typeface="Calibri" panose="020F0502020204030204" pitchFamily="34" charset="0"/>
+              <a:cs typeface="Times New Roman" panose="02020603050405020304" pitchFamily="18" charset="0"/>
+            </a:endParaRPr>
+          </a:p>
+          <a:p>
+            <a:pPr marL="0" marR="0">
+              <a:lnSpc>
+                <a:spcPts val="2015"/>
+              </a:lnSpc>
+              <a:spcBef>
+                <a:spcPts val="0"/>
+              </a:spcBef>
+              <a:spcAft>
+                <a:spcPts val="800"/>
+              </a:spcAft>
+            </a:pPr>
+            <a:r>
+              <a:rPr lang="fr-FR" sz="1200" kern="1200" dirty="0">
+                <a:solidFill>
+                  <a:srgbClr val="2F5496"/>
+                </a:solidFill>
+                <a:effectLst/>
+                <a:latin typeface="Poppins SemiBold" panose="00000700000000000000" pitchFamily="2" charset="0"/>
+                <a:ea typeface="Calibri" panose="020F0502020204030204" pitchFamily="34" charset="0"/>
+                <a:cs typeface="Times New Roman" panose="02020603050405020304" pitchFamily="18" charset="0"/>
+              </a:rPr>
+              <a:t> </a:t>
+            </a:r>
+            <a:endParaRPr lang="en-US" sz="1100" dirty="0">
+              <a:effectLst/>
+              <a:latin typeface="Calibri" panose="020F0502020204030204" pitchFamily="34" charset="0"/>
+              <a:ea typeface="Calibri" panose="020F0502020204030204" pitchFamily="34" charset="0"/>
+              <a:cs typeface="Times New Roman" panose="02020603050405020304" pitchFamily="18" charset="0"/>
+            </a:endParaRPr>
           </a:p>
         </p:txBody>
       </p:sp>
@@ -3458,9 +3729,36 @@
           <a:lstStyle/>
           <a:p>
             <a:r>
-              <a:rPr lang="en-US" dirty="0"/>
-              <a:t>ETUDE DE L’EXISTANT – Shell commands</a:t>
-            </a:r>
+              <a:rPr lang="en-US" dirty="0">
+                <a:solidFill>
+                  <a:srgbClr val="5A78AC"/>
+                </a:solidFill>
+                <a:latin typeface="Poppins SemiBold" panose="00000700000000000000" pitchFamily="2" charset="0"/>
+                <a:cs typeface="Poppins SemiBold" panose="00000700000000000000" pitchFamily="2" charset="0"/>
+              </a:rPr>
+              <a:t>ETUDE DE L’EXISTANT – </a:t>
+            </a:r>
+            <a:r>
+              <a:rPr lang="en-US" dirty="0" err="1">
+                <a:solidFill>
+                  <a:srgbClr val="5A78AC"/>
+                </a:solidFill>
+                <a:latin typeface="Poppins SemiBold" panose="00000700000000000000" pitchFamily="2" charset="0"/>
+                <a:cs typeface="Poppins SemiBold" panose="00000700000000000000" pitchFamily="2" charset="0"/>
+              </a:rPr>
+              <a:t>Commandes</a:t>
+            </a:r>
+            <a:r>
+              <a:rPr lang="en-US" dirty="0">
+                <a:solidFill>
+                  <a:srgbClr val="5A78AC"/>
+                </a:solidFill>
+                <a:latin typeface="Poppins SemiBold" panose="00000700000000000000" pitchFamily="2" charset="0"/>
+                <a:cs typeface="Poppins SemiBold" panose="00000700000000000000" pitchFamily="2" charset="0"/>
+              </a:rPr>
+              <a:t> shell</a:t>
+            </a:r>
+            <a:endParaRPr lang="en-US" dirty="0"/>
           </a:p>
         </p:txBody>
       </p:sp>
@@ -3482,53 +3780,53 @@
         </p:nvSpPr>
         <p:spPr/>
         <p:txBody>
-          <a:bodyPr/>
-          <a:lstStyle/>
-          <a:p>
-            <a:r>
-              <a:rPr lang="en-US" dirty="0"/>
-              <a:t>Disadvantages</a:t>
+          <a:bodyPr>
+            <a:normAutofit fontScale="92500"/>
+          </a:bodyPr>
+          <a:lstStyle/>
+          <a:p>
+            <a:r>
+              <a:rPr lang="fr-FR" dirty="0"/>
+              <a:t>Désavantages</a:t>
             </a:r>
           </a:p>
           <a:p>
             <a:pPr lvl="1"/>
             <a:r>
-              <a:rPr lang="en-US" dirty="0"/>
-              <a:t>Shell commands can be complex and intimidating for beginners</a:t>
-            </a:r>
+              <a:rPr lang="fr-FR" dirty="0"/>
+              <a:t>Les commandes Shell peuvent être complexes et intimidantes pour les débutants</a:t>
+            </a:r>
+          </a:p>
+          <a:p>
+            <a:endParaRPr lang="fr-FR" dirty="0"/>
           </a:p>
           <a:p>
             <a:pPr lvl="1"/>
+            <a:r>
+              <a:rPr lang="fr-FR" dirty="0"/>
+              <a:t>Ils ne fournissent pas de représentations visuelles des données de processus, ce qui rend plus difficile l'interprétation et l'analyse rapides des informations.</a:t>
+            </a:r>
+          </a:p>
+          <a:p>
+            <a:endParaRPr lang="fr-FR" dirty="0"/>
+          </a:p>
+          <a:p>
+            <a:pPr lvl="1"/>
+            <a:r>
+              <a:rPr lang="fr-FR" dirty="0"/>
+              <a:t>La surveillance d'un grand nombre de processus en temps réel peut s'avérer difficile et moins intuitive.</a:t>
+            </a:r>
+          </a:p>
+          <a:p>
+            <a:endParaRPr lang="fr-FR" dirty="0"/>
+          </a:p>
+          <a:p>
+            <a:pPr lvl="1"/>
+            <a:r>
+              <a:rPr lang="fr-FR" dirty="0"/>
+              <a:t>Ils manquent d’interactivité avancée et de fonctionnalités que l’on trouve dans les solutions complètes de surveillance basées sur une interface graphique.</a:t>
+            </a:r>
             <a:endParaRPr lang="en-US" dirty="0"/>
-          </a:p>
-          <a:p>
-            <a:pPr lvl="1"/>
-            <a:r>
-              <a:rPr lang="en-US" dirty="0"/>
-              <a:t>They do not provide visual representations of process data making it harder to quickly interpret and analyze information.</a:t>
-            </a:r>
-          </a:p>
-          <a:p>
-            <a:pPr lvl="1"/>
-            <a:endParaRPr lang="en-US" dirty="0"/>
-          </a:p>
-          <a:p>
-            <a:pPr lvl="1"/>
-            <a:r>
-              <a:rPr lang="en-US" dirty="0"/>
-              <a:t>Monitoring large numbers of processes in real-time can be challenging and less intuitive</a:t>
-            </a:r>
-          </a:p>
-          <a:p>
-            <a:pPr lvl="1"/>
-            <a:endParaRPr lang="en-US" dirty="0"/>
-          </a:p>
-          <a:p>
-            <a:pPr lvl="1"/>
-            <a:r>
-              <a:rPr lang="en-US" dirty="0"/>
-              <a:t>They lack advanced interactivity and features found in comprehensive GUI-based monitoring solutions.</a:t>
-            </a:r>
           </a:p>
         </p:txBody>
       </p:sp>
@@ -3584,12 +3882,14 @@
           <a:lstStyle/>
           <a:p>
             <a:r>
-              <a:rPr lang="en-US" dirty="0"/>
-              <a:t>ETUDE DE L’EXISTANT – </a:t>
-            </a:r>
-            <a:r>
-              <a:rPr lang="en-US" dirty="0" err="1"/>
-              <a:t>Supervisord</a:t>
+              <a:rPr lang="en-US" dirty="0">
+                <a:solidFill>
+                  <a:srgbClr val="5A78AC"/>
+                </a:solidFill>
+                <a:latin typeface="Poppins SemiBold" panose="00000700000000000000" pitchFamily="2" charset="0"/>
+                <a:cs typeface="Poppins SemiBold" panose="00000700000000000000" pitchFamily="2" charset="0"/>
+              </a:rPr>
+              <a:t>ETUDE DE L’EXISTANT – Supervisor</a:t>
             </a:r>
             <a:endParaRPr lang="en-US" dirty="0"/>
           </a:p>
@@ -3617,35 +3917,40 @@
           <a:lstStyle/>
           <a:p>
             <a:r>
-              <a:rPr lang="en-US" dirty="0"/>
-              <a:t>Supervisor is a client/server system that allows its users to monitor and control a number of process on UNIX-like operating systems.</a:t>
-            </a:r>
-          </a:p>
-          <a:p>
+              <a:rPr lang="fr-FR" dirty="0" err="1"/>
+              <a:t>Supervisor</a:t>
+            </a:r>
+            <a:r>
+              <a:rPr lang="fr-FR" dirty="0"/>
+              <a:t> est un système client/serveur qui permet à ses utilisateurs de surveiller et de contrôler un certain nombre de processus sur des systèmes d'exploitation de type UNIX.</a:t>
+            </a:r>
+          </a:p>
+          <a:p>
+            <a:endParaRPr lang="fr-FR" dirty="0"/>
+          </a:p>
+          <a:p>
+            <a:r>
+              <a:rPr lang="fr-FR" dirty="0"/>
+              <a:t>Particulièrement utile pour gérer les processus liés aux applications Web et autres services de longue durée.</a:t>
+            </a:r>
+          </a:p>
+          <a:p>
+            <a:endParaRPr lang="fr-FR" dirty="0"/>
+          </a:p>
+          <a:p>
+            <a:r>
+              <a:rPr lang="fr-FR" dirty="0"/>
+              <a:t>Il est livré avec une interface de ligne de commande (</a:t>
+            </a:r>
+            <a:r>
+              <a:rPr lang="fr-FR" dirty="0" err="1"/>
+              <a:t>supervisorctl</a:t>
+            </a:r>
+            <a:r>
+              <a:rPr lang="fr-FR" dirty="0"/>
+              <a:t>) ainsi qu'une interface utilisateur Web.</a:t>
+            </a:r>
             <a:endParaRPr lang="en-US" dirty="0"/>
-          </a:p>
-          <a:p>
-            <a:r>
-              <a:rPr lang="en-US" dirty="0"/>
-              <a:t>Especially useful for managing processes related to web applications and other long-running services.</a:t>
-            </a:r>
-          </a:p>
-          <a:p>
-            <a:endParaRPr lang="en-US" dirty="0"/>
-          </a:p>
-          <a:p>
-            <a:r>
-              <a:rPr lang="en-US" dirty="0"/>
-              <a:t>It comes with a command-line interface (</a:t>
-            </a:r>
-            <a:r>
-              <a:rPr lang="en-US" dirty="0" err="1"/>
-              <a:t>supervisorctl</a:t>
-            </a:r>
-            <a:r>
-              <a:rPr lang="en-US" dirty="0"/>
-              <a:t>) as well as a web-based user interface.</a:t>
-            </a:r>
           </a:p>
         </p:txBody>
       </p:sp>
@@ -3701,12 +4006,14 @@
           <a:lstStyle/>
           <a:p>
             <a:r>
-              <a:rPr lang="en-US" dirty="0"/>
-              <a:t>ETUDE DE L’EXISTANT – </a:t>
-            </a:r>
-            <a:r>
-              <a:rPr lang="en-US" dirty="0" err="1"/>
-              <a:t>Supervisord</a:t>
+              <a:rPr lang="en-US" dirty="0">
+                <a:solidFill>
+                  <a:srgbClr val="5A78AC"/>
+                </a:solidFill>
+                <a:latin typeface="Poppins SemiBold" panose="00000700000000000000" pitchFamily="2" charset="0"/>
+                <a:cs typeface="Poppins SemiBold" panose="00000700000000000000" pitchFamily="2" charset="0"/>
+              </a:rPr>
+              <a:t>ETUDE DE L’EXISTANT – Supervisor</a:t>
             </a:r>
             <a:endParaRPr lang="en-US" dirty="0"/>
           </a:p>
@@ -3731,75 +4038,82 @@
         <p:spPr/>
         <p:txBody>
           <a:bodyPr>
-            <a:normAutofit lnSpcReduction="10000"/>
+            <a:normAutofit fontScale="92500" lnSpcReduction="10000"/>
           </a:bodyPr>
           <a:lstStyle/>
           <a:p>
             <a:r>
-              <a:rPr lang="en-US" dirty="0"/>
-              <a:t>Key features of supervisor include:</a:t>
+              <a:rPr lang="fr-FR" dirty="0"/>
+              <a:t>Les principales fonctionnalités du superviseur comprennent :</a:t>
             </a:r>
           </a:p>
           <a:p>
             <a:pPr lvl="1"/>
             <a:r>
-              <a:rPr lang="en-US" dirty="0"/>
-              <a:t>Process control and monitoring</a:t>
+              <a:rPr lang="fr-FR" dirty="0"/>
+              <a:t>Contrôle et surveillance des processus</a:t>
             </a:r>
           </a:p>
           <a:p>
             <a:pPr lvl="1"/>
             <a:r>
-              <a:rPr lang="en-US" dirty="0"/>
-              <a:t>Process groups</a:t>
+              <a:rPr lang="fr-FR" dirty="0"/>
+              <a:t>Groupes de processus</a:t>
             </a:r>
           </a:p>
           <a:p>
             <a:pPr lvl="1"/>
             <a:r>
-              <a:rPr lang="en-US" dirty="0"/>
-              <a:t>Logging</a:t>
+              <a:rPr lang="fr-FR" dirty="0"/>
+              <a:t>Enregistrement</a:t>
             </a:r>
           </a:p>
           <a:p>
             <a:pPr lvl="1"/>
             <a:r>
-              <a:rPr lang="en-US" dirty="0"/>
-              <a:t>Web interface</a:t>
-            </a:r>
-          </a:p>
-          <a:p>
-            <a:pPr lvl="1"/>
+              <a:rPr lang="fr-FR" dirty="0"/>
+              <a:t>interface Web</a:t>
+            </a:r>
+          </a:p>
+          <a:p>
+            <a:endParaRPr lang="fr-FR" dirty="0"/>
+          </a:p>
+          <a:p>
+            <a:r>
+              <a:rPr lang="fr-FR" dirty="0"/>
+              <a:t>Pour utiliser </a:t>
+            </a:r>
+            <a:r>
+              <a:rPr lang="fr-FR" dirty="0" err="1"/>
+              <a:t>Supervisor</a:t>
+            </a:r>
+            <a:r>
+              <a:rPr lang="fr-FR" dirty="0"/>
+              <a:t> efficacement, vous devez créer un fichier de configuration, généralement situé dans /</a:t>
+            </a:r>
+            <a:r>
+              <a:rPr lang="fr-FR" dirty="0" err="1"/>
+              <a:t>etc</a:t>
+            </a:r>
+            <a:r>
+              <a:rPr lang="fr-FR" dirty="0"/>
+              <a:t>/</a:t>
+            </a:r>
+            <a:r>
+              <a:rPr lang="fr-FR" dirty="0" err="1"/>
+              <a:t>supervisord.conf</a:t>
+            </a:r>
+            <a:endParaRPr lang="fr-FR" dirty="0"/>
+          </a:p>
+          <a:p>
+            <a:endParaRPr lang="fr-FR" dirty="0"/>
+          </a:p>
+          <a:p>
+            <a:r>
+              <a:rPr lang="fr-FR" dirty="0"/>
+              <a:t>Le tableau de la diapositive suivante montre comment le superviseur exerce ses différentes fonctions</a:t>
+            </a:r>
             <a:endParaRPr lang="en-US" dirty="0"/>
-          </a:p>
-          <a:p>
-            <a:r>
-              <a:rPr lang="en-US" dirty="0"/>
-              <a:t>To use supervisor effectively, you need to create a configuration file, typically located at /</a:t>
-            </a:r>
-            <a:r>
-              <a:rPr lang="en-US" dirty="0" err="1"/>
-              <a:t>etc</a:t>
-            </a:r>
-            <a:r>
-              <a:rPr lang="en-US" dirty="0"/>
-              <a:t>/</a:t>
-            </a:r>
-            <a:r>
-              <a:rPr lang="en-US" dirty="0" err="1"/>
-              <a:t>supervisord.conf</a:t>
-            </a:r>
-            <a:endParaRPr lang="en-US" dirty="0"/>
-          </a:p>
-          <a:p>
-            <a:pPr lvl="1"/>
-            <a:endParaRPr lang="en-US" dirty="0"/>
-          </a:p>
-          <a:p>
-            <a:r>
-              <a:rPr lang="en-US" dirty="0"/>
-              <a:t>The table on the next slide shows how supervisor carries out its various functions</a:t>
-            </a:r>
           </a:p>
         </p:txBody>
       </p:sp>
@@ -3855,12 +4169,14 @@
           <a:lstStyle/>
           <a:p>
             <a:r>
-              <a:rPr lang="en-US" dirty="0"/>
-              <a:t>ETUDE DE L’EXISTANT – </a:t>
-            </a:r>
-            <a:r>
-              <a:rPr lang="en-US" dirty="0" err="1"/>
-              <a:t>Supervisord</a:t>
+              <a:rPr lang="en-US" dirty="0">
+                <a:solidFill>
+                  <a:srgbClr val="5A78AC"/>
+                </a:solidFill>
+                <a:latin typeface="Poppins SemiBold" panose="00000700000000000000" pitchFamily="2" charset="0"/>
+                <a:cs typeface="Poppins SemiBold" panose="00000700000000000000" pitchFamily="2" charset="0"/>
+              </a:rPr>
+              <a:t>ETUDE DE L’EXISTANT – Supervisor</a:t>
             </a:r>
             <a:endParaRPr lang="en-US" dirty="0"/>
           </a:p>
@@ -3882,7 +4198,7 @@
             <p:ph idx="1"/>
             <p:extLst>
               <p:ext uri="{D42A27DB-BD31-4B8C-83A1-F6EECF244321}">
-                <p14:modId xmlns:p14="http://schemas.microsoft.com/office/powerpoint/2010/main" val="1419119372"/>
+                <p14:modId xmlns:p14="http://schemas.microsoft.com/office/powerpoint/2010/main" val="3095380371"/>
               </p:ext>
             </p:extLst>
           </p:nvPr>
@@ -3974,8 +4290,13 @@
                     <a:p>
                       <a:r>
                         <a:rPr lang="en-US" dirty="0"/>
-                        <a:t>Resource Monitoring</a:t>
-                      </a:r>
+                        <a:t>Surveillance des </a:t>
+                      </a:r>
+                      <a:r>
+                        <a:rPr lang="en-US" dirty="0" err="1"/>
+                        <a:t>ressources</a:t>
+                      </a:r>
+                      <a:endParaRPr lang="en-US" dirty="0"/>
                     </a:p>
                   </a:txBody>
                   <a:tcPr/>
@@ -4021,7 +4342,7 @@
                     <a:p>
                       <a:r>
                         <a:rPr lang="en-US" dirty="0"/>
-                        <a:t>Process Management</a:t>
+                        <a:t>Gestion des processus</a:t>
                       </a:r>
                     </a:p>
                   </a:txBody>
@@ -4126,7 +4447,7 @@
                     <a:p>
                       <a:r>
                         <a:rPr lang="en-US" dirty="0"/>
-                        <a:t>Service Management</a:t>
+                        <a:t>Gestion des services</a:t>
                       </a:r>
                     </a:p>
                   </a:txBody>
@@ -4245,12 +4566,14 @@
           <a:lstStyle/>
           <a:p>
             <a:r>
-              <a:rPr lang="en-US" dirty="0"/>
-              <a:t>ETUDE DE L’EXISTANT – </a:t>
-            </a:r>
-            <a:r>
-              <a:rPr lang="en-US" dirty="0" err="1"/>
-              <a:t>Supervisord</a:t>
+              <a:rPr lang="en-US" dirty="0">
+                <a:solidFill>
+                  <a:srgbClr val="5A78AC"/>
+                </a:solidFill>
+                <a:latin typeface="Poppins SemiBold" panose="00000700000000000000" pitchFamily="2" charset="0"/>
+                <a:cs typeface="Poppins SemiBold" panose="00000700000000000000" pitchFamily="2" charset="0"/>
+              </a:rPr>
+              <a:t>ETUDE DE L’EXISTANT – Supervisor</a:t>
             </a:r>
             <a:endParaRPr lang="en-US" dirty="0"/>
           </a:p>
@@ -4274,50 +4597,49 @@
         </p:nvSpPr>
         <p:spPr/>
         <p:txBody>
-          <a:bodyPr/>
-          <a:lstStyle/>
-          <a:p>
-            <a:r>
-              <a:rPr lang="en-US" dirty="0"/>
-              <a:t>Advantages</a:t>
+          <a:bodyPr>
+            <a:normAutofit fontScale="92500" lnSpcReduction="10000"/>
+          </a:bodyPr>
+          <a:lstStyle/>
+          <a:p>
+            <a:r>
+              <a:rPr lang="fr-FR" dirty="0"/>
+              <a:t>Avantages</a:t>
             </a:r>
           </a:p>
           <a:p>
             <a:pPr lvl="1"/>
             <a:r>
-              <a:rPr lang="en-US" dirty="0"/>
-              <a:t>It automates process management tasks such as starting, stopping and restarting processes.</a:t>
-            </a:r>
+              <a:rPr lang="fr-FR" dirty="0"/>
+              <a:t>Il automatise les tâches de gestion des processus telles que le démarrage, l'arrêt et le redémarrage des processus.</a:t>
+            </a:r>
+          </a:p>
+          <a:p>
+            <a:endParaRPr lang="fr-FR" dirty="0"/>
+          </a:p>
+          <a:p>
+            <a:endParaRPr lang="fr-FR" dirty="0"/>
           </a:p>
           <a:p>
             <a:pPr lvl="1"/>
+            <a:r>
+              <a:rPr lang="fr-FR" dirty="0"/>
+              <a:t>Surveille en permanence l’état des processus et les redémarre s’ils ne répondent plus ou tombent en panne.</a:t>
+            </a:r>
+          </a:p>
+          <a:p>
+            <a:endParaRPr lang="fr-FR" dirty="0"/>
+          </a:p>
+          <a:p>
+            <a:endParaRPr lang="fr-FR" dirty="0"/>
+          </a:p>
+          <a:p>
+            <a:pPr lvl="1"/>
+            <a:r>
+              <a:rPr lang="fr-FR" dirty="0"/>
+              <a:t>Les processus peuvent être organisés en groupes, permettant une gestion et une priorisation plus faciles des tâches.</a:t>
+            </a:r>
             <a:endParaRPr lang="en-US" dirty="0"/>
-          </a:p>
-          <a:p>
-            <a:pPr lvl="1"/>
-            <a:endParaRPr lang="en-US" dirty="0"/>
-          </a:p>
-          <a:p>
-            <a:pPr lvl="1"/>
-            <a:r>
-              <a:rPr lang="en-US" dirty="0"/>
-              <a:t>Continuously monitors the health of processes and restarts them if they become unresponsive or crash.</a:t>
-            </a:r>
-          </a:p>
-          <a:p>
-            <a:pPr lvl="1"/>
-            <a:endParaRPr lang="en-US" dirty="0"/>
-          </a:p>
-          <a:p>
-            <a:pPr lvl="1"/>
-            <a:endParaRPr lang="en-US" dirty="0"/>
-          </a:p>
-          <a:p>
-            <a:pPr lvl="1"/>
-            <a:r>
-              <a:rPr lang="en-US" dirty="0"/>
-              <a:t>Processes can be organized into groups, allowing for easier management and prioritization of tasks.</a:t>
-            </a:r>
           </a:p>
         </p:txBody>
       </p:sp>
@@ -4373,12 +4695,14 @@
           <a:lstStyle/>
           <a:p>
             <a:r>
-              <a:rPr lang="en-US" dirty="0"/>
-              <a:t>ETUDE DE L’EXISTANT – </a:t>
-            </a:r>
-            <a:r>
-              <a:rPr lang="en-US" dirty="0" err="1"/>
-              <a:t>Supervisord</a:t>
+              <a:rPr lang="en-US" dirty="0">
+                <a:solidFill>
+                  <a:srgbClr val="5A78AC"/>
+                </a:solidFill>
+                <a:latin typeface="Poppins SemiBold" panose="00000700000000000000" pitchFamily="2" charset="0"/>
+                <a:cs typeface="Poppins SemiBold" panose="00000700000000000000" pitchFamily="2" charset="0"/>
+              </a:rPr>
+              <a:t>ETUDE DE L’EXISTANT – Supervisor</a:t>
             </a:r>
             <a:endParaRPr lang="en-US" dirty="0"/>
           </a:p>
@@ -4402,51 +4726,43 @@
         </p:nvSpPr>
         <p:spPr/>
         <p:txBody>
-          <a:bodyPr/>
-          <a:lstStyle/>
-          <a:p>
-            <a:r>
-              <a:rPr lang="en-US" dirty="0" err="1"/>
-              <a:t>Disdvantages</a:t>
+          <a:bodyPr>
+            <a:normAutofit/>
+          </a:bodyPr>
+          <a:lstStyle/>
+          <a:p>
+            <a:r>
+              <a:rPr lang="fr-FR" dirty="0"/>
+              <a:t>Inconvénients</a:t>
+            </a:r>
+          </a:p>
+          <a:p>
+            <a:pPr lvl="1"/>
+            <a:r>
+              <a:rPr lang="fr-FR" dirty="0"/>
+              <a:t>Consomme des ressources système, ce qui peut avoir un impact sur les performances du système</a:t>
+            </a:r>
+          </a:p>
+          <a:p>
+            <a:endParaRPr lang="fr-FR" dirty="0"/>
+          </a:p>
+          <a:p>
+            <a:pPr lvl="1"/>
+            <a:r>
+              <a:rPr lang="fr-FR" dirty="0"/>
+              <a:t>La configuration du superviseur nécessite de comprendre le format de son fichier de configuration, ce qui peut être complexe pour les utilisateurs novices.</a:t>
+            </a:r>
+          </a:p>
+          <a:p>
+            <a:endParaRPr lang="fr-FR" dirty="0"/>
+          </a:p>
+          <a:p>
+            <a:pPr lvl="1"/>
+            <a:r>
+              <a:rPr lang="fr-FR" dirty="0"/>
+              <a:t>Des erreurs de configuration dans le fichier de configuration du superviseur peuvent entraîner un comportement ou des échecs involontaires.</a:t>
             </a:r>
             <a:endParaRPr lang="en-US" dirty="0"/>
-          </a:p>
-          <a:p>
-            <a:pPr lvl="1"/>
-            <a:r>
-              <a:rPr lang="en-US" dirty="0"/>
-              <a:t>Consumes system resources which may impact system performance</a:t>
-            </a:r>
-          </a:p>
-          <a:p>
-            <a:pPr lvl="1"/>
-            <a:endParaRPr lang="en-US" dirty="0"/>
-          </a:p>
-          <a:p>
-            <a:pPr lvl="1"/>
-            <a:r>
-              <a:rPr lang="en-US" dirty="0"/>
-              <a:t>Configuring supervisor requires understanding its configuration file </a:t>
-            </a:r>
-            <a:r>
-              <a:rPr lang="en-US" dirty="0" err="1"/>
-              <a:t>formate</a:t>
-            </a:r>
-            <a:r>
-              <a:rPr lang="en-US" dirty="0"/>
-              <a:t>, which can be complex for novice users.</a:t>
-            </a:r>
-          </a:p>
-          <a:p>
-            <a:pPr lvl="1"/>
-            <a:endParaRPr lang="en-US" dirty="0"/>
-          </a:p>
-          <a:p>
-            <a:pPr lvl="1"/>
-            <a:r>
-              <a:rPr lang="en-US" dirty="0"/>
-              <a:t>Misconfigurations in supervisor’s configuration file can lead to unintended behavior or failures.</a:t>
-            </a:r>
           </a:p>
         </p:txBody>
       </p:sp>
@@ -4502,41 +4818,68 @@
           <a:lstStyle/>
           <a:p>
             <a:r>
-              <a:rPr lang="en-US" dirty="0"/>
-              <a:t>ETUDE DE L’EXISTANT - MONIT</a:t>
-            </a:r>
-          </a:p>
-        </p:txBody>
-      </p:sp>
-      <p:sp>
-        <p:nvSpPr>
-          <p:cNvPr id="3" name="Content Placeholder 2">
-            <a:extLst>
-              <a:ext uri="{FF2B5EF4-FFF2-40B4-BE49-F238E27FC236}">
-                <a16:creationId xmlns:a16="http://schemas.microsoft.com/office/drawing/2014/main" id="{F10ADC83-FC1C-CDBC-DAD3-BEC23ECBE2EC}"/>
-              </a:ext>
-            </a:extLst>
-          </p:cNvPr>
-          <p:cNvSpPr>
-            <a:spLocks noGrp="1"/>
-          </p:cNvSpPr>
+              <a:rPr lang="en-US" dirty="0">
+                <a:solidFill>
+                  <a:srgbClr val="5A78AC"/>
+                </a:solidFill>
+                <a:latin typeface="Poppins SemiBold" panose="00000700000000000000" pitchFamily="2" charset="0"/>
+                <a:cs typeface="Poppins SemiBold" panose="00000700000000000000" pitchFamily="2" charset="0"/>
+              </a:rPr>
+              <a:t>DIAGRAMMES UML – Cas </a:t>
+            </a:r>
+            <a:r>
+              <a:rPr lang="en-US" dirty="0" err="1">
+                <a:solidFill>
+                  <a:srgbClr val="5A78AC"/>
+                </a:solidFill>
+                <a:latin typeface="Poppins SemiBold" panose="00000700000000000000" pitchFamily="2" charset="0"/>
+                <a:cs typeface="Poppins SemiBold" panose="00000700000000000000" pitchFamily="2" charset="0"/>
+              </a:rPr>
+              <a:t>d’utilisation</a:t>
+            </a:r>
+            <a:endParaRPr lang="en-US" dirty="0"/>
+          </a:p>
+        </p:txBody>
+      </p:sp>
+      <p:pic>
+        <p:nvPicPr>
+          <p:cNvPr id="5" name="Content Placeholder 4">
+            <a:extLst>
+              <a:ext uri="{FF2B5EF4-FFF2-40B4-BE49-F238E27FC236}">
+                <a16:creationId xmlns:a16="http://schemas.microsoft.com/office/drawing/2014/main" id="{B5C267AD-2A9F-C26E-4BFA-FD6288C34766}"/>
+              </a:ext>
+            </a:extLst>
+          </p:cNvPr>
+          <p:cNvPicPr>
+            <a:picLocks noGrp="1" noChangeAspect="1"/>
+          </p:cNvPicPr>
           <p:nvPr>
             <p:ph idx="1"/>
           </p:nvPr>
-        </p:nvSpPr>
-        <p:spPr/>
-        <p:txBody>
-          <a:bodyPr/>
-          <a:lstStyle/>
-          <a:p>
-            <a:endParaRPr lang="en-US" dirty="0"/>
-          </a:p>
-        </p:txBody>
-      </p:sp>
+        </p:nvPicPr>
+        <p:blipFill>
+          <a:blip r:embed="rId2">
+            <a:extLst>
+              <a:ext uri="{28A0092B-C50C-407E-A947-70E740481C1C}">
+                <a14:useLocalDpi xmlns:a14="http://schemas.microsoft.com/office/drawing/2010/main" val="0"/>
+              </a:ext>
+            </a:extLst>
+          </a:blip>
+          <a:stretch>
+            <a:fillRect/>
+          </a:stretch>
+        </p:blipFill>
+        <p:spPr>
+          <a:xfrm>
+            <a:off x="3328482" y="1825625"/>
+            <a:ext cx="5535035" cy="4351338"/>
+          </a:xfrm>
+        </p:spPr>
+      </p:pic>
     </p:spTree>
     <p:extLst>
       <p:ext uri="{BB962C8B-B14F-4D97-AF65-F5344CB8AC3E}">
-        <p14:creationId xmlns:p14="http://schemas.microsoft.com/office/powerpoint/2010/main" val="3378123597"/>
+        <p14:creationId xmlns:p14="http://schemas.microsoft.com/office/powerpoint/2010/main" val="2271704949"/>
       </p:ext>
     </p:extLst>
   </p:cSld>
@@ -4585,129 +4928,88 @@
           <a:lstStyle/>
           <a:p>
             <a:r>
-              <a:rPr lang="en-US" dirty="0"/>
-              <a:t>ETUDE DE L’EXISTANT - Glances</a:t>
-            </a:r>
-          </a:p>
-        </p:txBody>
-      </p:sp>
-      <p:sp>
-        <p:nvSpPr>
-          <p:cNvPr id="3" name="Content Placeholder 2">
-            <a:extLst>
-              <a:ext uri="{FF2B5EF4-FFF2-40B4-BE49-F238E27FC236}">
-                <a16:creationId xmlns:a16="http://schemas.microsoft.com/office/drawing/2014/main" id="{F10ADC83-FC1C-CDBC-DAD3-BEC23ECBE2EC}"/>
-              </a:ext>
-            </a:extLst>
-          </p:cNvPr>
-          <p:cNvSpPr>
-            <a:spLocks noGrp="1"/>
-          </p:cNvSpPr>
+              <a:rPr lang="en-US" dirty="0">
+                <a:solidFill>
+                  <a:srgbClr val="5A78AC"/>
+                </a:solidFill>
+                <a:latin typeface="Poppins SemiBold" panose="00000700000000000000" pitchFamily="2" charset="0"/>
+                <a:cs typeface="Poppins SemiBold" panose="00000700000000000000" pitchFamily="2" charset="0"/>
+              </a:rPr>
+              <a:t>DIAGRAMMES UML – </a:t>
+            </a:r>
+            <a:r>
+              <a:rPr lang="en-US" dirty="0" err="1">
+                <a:solidFill>
+                  <a:srgbClr val="5A78AC"/>
+                </a:solidFill>
+                <a:latin typeface="Poppins SemiBold" panose="00000700000000000000" pitchFamily="2" charset="0"/>
+                <a:cs typeface="Poppins SemiBold" panose="00000700000000000000" pitchFamily="2" charset="0"/>
+              </a:rPr>
+              <a:t>Diagramme</a:t>
+            </a:r>
+            <a:r>
+              <a:rPr lang="en-US" dirty="0">
+                <a:solidFill>
+                  <a:srgbClr val="5A78AC"/>
+                </a:solidFill>
+                <a:latin typeface="Poppins SemiBold" panose="00000700000000000000" pitchFamily="2" charset="0"/>
+                <a:cs typeface="Poppins SemiBold" panose="00000700000000000000" pitchFamily="2" charset="0"/>
+              </a:rPr>
+              <a:t> de </a:t>
+            </a:r>
+            <a:r>
+              <a:rPr lang="en-US" dirty="0" err="1">
+                <a:solidFill>
+                  <a:srgbClr val="5A78AC"/>
+                </a:solidFill>
+                <a:latin typeface="Poppins SemiBold" panose="00000700000000000000" pitchFamily="2" charset="0"/>
+                <a:cs typeface="Poppins SemiBold" panose="00000700000000000000" pitchFamily="2" charset="0"/>
+              </a:rPr>
+              <a:t>classe</a:t>
+            </a:r>
+            <a:endParaRPr lang="en-US" dirty="0"/>
+          </a:p>
+        </p:txBody>
+      </p:sp>
+      <p:pic>
+        <p:nvPicPr>
+          <p:cNvPr id="7" name="Content Placeholder 6">
+            <a:extLst>
+              <a:ext uri="{FF2B5EF4-FFF2-40B4-BE49-F238E27FC236}">
+                <a16:creationId xmlns:a16="http://schemas.microsoft.com/office/drawing/2014/main" id="{06F95A27-5E5B-2EF2-4A7A-0A20E51D4104}"/>
+              </a:ext>
+            </a:extLst>
+          </p:cNvPr>
+          <p:cNvPicPr>
+            <a:picLocks noGrp="1" noChangeAspect="1"/>
+          </p:cNvPicPr>
           <p:nvPr>
             <p:ph idx="1"/>
           </p:nvPr>
-        </p:nvSpPr>
-        <p:spPr/>
-        <p:txBody>
-          <a:bodyPr/>
-          <a:lstStyle/>
-          <a:p>
-            <a:endParaRPr lang="en-US" dirty="0"/>
-          </a:p>
-        </p:txBody>
-      </p:sp>
+        </p:nvPicPr>
+        <p:blipFill>
+          <a:blip r:embed="rId2">
+            <a:extLst>
+              <a:ext uri="{28A0092B-C50C-407E-A947-70E740481C1C}">
+                <a14:useLocalDpi xmlns:a14="http://schemas.microsoft.com/office/drawing/2010/main" val="0"/>
+              </a:ext>
+            </a:extLst>
+          </a:blip>
+          <a:stretch>
+            <a:fillRect/>
+          </a:stretch>
+        </p:blipFill>
+        <p:spPr>
+          <a:xfrm>
+            <a:off x="2767012" y="2934494"/>
+            <a:ext cx="6657975" cy="2133600"/>
+          </a:xfrm>
+        </p:spPr>
+      </p:pic>
     </p:spTree>
     <p:extLst>
       <p:ext uri="{BB962C8B-B14F-4D97-AF65-F5344CB8AC3E}">
-        <p14:creationId xmlns:p14="http://schemas.microsoft.com/office/powerpoint/2010/main" val="4175405594"/>
-      </p:ext>
-    </p:extLst>
-  </p:cSld>
-  <p:clrMapOvr>
-    <a:masterClrMapping/>
-  </p:clrMapOvr>
-</p:sld>
-</file>
-
-<file path=ppt/slides/slide18.xml><?xml version="1.0" encoding="utf-8"?>
-<p:sld xmlns:a="http://schemas.openxmlformats.org/drawingml/2006/main" xmlns:r="http://schemas.openxmlformats.org/officeDocument/2006/relationships" xmlns:p="http://schemas.openxmlformats.org/presentationml/2006/main">
-  <p:cSld>
-    <p:spTree>
-      <p:nvGrpSpPr>
-        <p:cNvPr id="1" name=""/>
-        <p:cNvGrpSpPr/>
-        <p:nvPr/>
-      </p:nvGrpSpPr>
-      <p:grpSpPr>
-        <a:xfrm>
-          <a:off x="0" y="0"/>
-          <a:ext cx="0" cy="0"/>
-          <a:chOff x="0" y="0"/>
-          <a:chExt cx="0" cy="0"/>
-        </a:xfrm>
-      </p:grpSpPr>
-      <p:sp>
-        <p:nvSpPr>
-          <p:cNvPr id="2" name="Title 1">
-            <a:extLst>
-              <a:ext uri="{FF2B5EF4-FFF2-40B4-BE49-F238E27FC236}">
-                <a16:creationId xmlns:a16="http://schemas.microsoft.com/office/drawing/2014/main" id="{6E826DB0-61A8-CC9A-BA93-A7FFC877CF5E}"/>
-              </a:ext>
-            </a:extLst>
-          </p:cNvPr>
-          <p:cNvSpPr>
-            <a:spLocks noGrp="1"/>
-          </p:cNvSpPr>
-          <p:nvPr>
-            <p:ph type="title"/>
-          </p:nvPr>
-        </p:nvSpPr>
-        <p:spPr/>
-        <p:txBody>
-          <a:bodyPr/>
-          <a:lstStyle/>
-          <a:p>
-            <a:r>
-              <a:rPr lang="en-US" dirty="0"/>
-              <a:t>DIAGRAMMES UML – Cas </a:t>
-            </a:r>
-            <a:r>
-              <a:rPr lang="en-US" dirty="0" err="1"/>
-              <a:t>d’utilisation</a:t>
-            </a:r>
-            <a:endParaRPr lang="en-US" dirty="0"/>
-          </a:p>
-        </p:txBody>
-      </p:sp>
-      <p:sp>
-        <p:nvSpPr>
-          <p:cNvPr id="3" name="Content Placeholder 2">
-            <a:extLst>
-              <a:ext uri="{FF2B5EF4-FFF2-40B4-BE49-F238E27FC236}">
-                <a16:creationId xmlns:a16="http://schemas.microsoft.com/office/drawing/2014/main" id="{F10ADC83-FC1C-CDBC-DAD3-BEC23ECBE2EC}"/>
-              </a:ext>
-            </a:extLst>
-          </p:cNvPr>
-          <p:cNvSpPr>
-            <a:spLocks noGrp="1"/>
-          </p:cNvSpPr>
-          <p:nvPr>
-            <p:ph idx="1"/>
-          </p:nvPr>
-        </p:nvSpPr>
-        <p:spPr/>
-        <p:txBody>
-          <a:bodyPr/>
-          <a:lstStyle/>
-          <a:p>
-            <a:endParaRPr lang="en-US" dirty="0"/>
-          </a:p>
-        </p:txBody>
-      </p:sp>
-    </p:spTree>
-    <p:extLst>
-      <p:ext uri="{BB962C8B-B14F-4D97-AF65-F5344CB8AC3E}">
-        <p14:creationId xmlns:p14="http://schemas.microsoft.com/office/powerpoint/2010/main" val="2271704949"/>
+        <p14:creationId xmlns:p14="http://schemas.microsoft.com/office/powerpoint/2010/main" val="2511586634"/>
       </p:ext>
     </p:extLst>
   </p:cSld>
@@ -4756,7 +5058,13 @@
           <a:lstStyle/>
           <a:p>
             <a:r>
-              <a:rPr lang="en-US" dirty="0"/>
+              <a:rPr lang="en-US" dirty="0">
+                <a:solidFill>
+                  <a:srgbClr val="5A78AC"/>
+                </a:solidFill>
+                <a:latin typeface="Poppins SemiBold" panose="00000700000000000000" pitchFamily="2" charset="0"/>
+                <a:cs typeface="Poppins SemiBold" panose="00000700000000000000" pitchFamily="2" charset="0"/>
+              </a:rPr>
               <a:t>PLAN</a:t>
             </a:r>
           </a:p>
@@ -4786,137 +5094,214 @@
           <a:lstStyle/>
           <a:p>
             <a:r>
-              <a:rPr lang="en-US" dirty="0"/>
+              <a:rPr lang="en-US" dirty="0">
+                <a:solidFill>
+                  <a:srgbClr val="5A78AC"/>
+                </a:solidFill>
+              </a:rPr>
               <a:t>INTRODUCTION</a:t>
             </a:r>
           </a:p>
           <a:p>
-            <a:endParaRPr lang="en-US" dirty="0"/>
-          </a:p>
-          <a:p>
-            <a:endParaRPr lang="en-US" dirty="0"/>
-          </a:p>
-          <a:p>
-            <a:r>
-              <a:rPr lang="en-US" dirty="0"/>
+            <a:endParaRPr lang="en-US" dirty="0">
+              <a:solidFill>
+                <a:srgbClr val="5A78AC"/>
+              </a:solidFill>
+            </a:endParaRPr>
+          </a:p>
+          <a:p>
+            <a:endParaRPr lang="en-US" dirty="0">
+              <a:solidFill>
+                <a:srgbClr val="5A78AC"/>
+              </a:solidFill>
+            </a:endParaRPr>
+          </a:p>
+          <a:p>
+            <a:r>
+              <a:rPr lang="en-US" dirty="0">
+                <a:solidFill>
+                  <a:srgbClr val="5A78AC"/>
+                </a:solidFill>
+              </a:rPr>
               <a:t>ETUDE DE L’EXISTANT</a:t>
             </a:r>
           </a:p>
           <a:p>
             <a:pPr lvl="1"/>
             <a:r>
-              <a:rPr lang="en-US" dirty="0"/>
+              <a:rPr lang="en-US" dirty="0">
+                <a:solidFill>
+                  <a:srgbClr val="5A78AC"/>
+                </a:solidFill>
+              </a:rPr>
               <a:t>Les </a:t>
             </a:r>
             <a:r>
-              <a:rPr lang="en-US" dirty="0" err="1"/>
+              <a:rPr lang="en-US" dirty="0" err="1">
+                <a:solidFill>
+                  <a:srgbClr val="5A78AC"/>
+                </a:solidFill>
+              </a:rPr>
               <a:t>commandes</a:t>
             </a:r>
             <a:r>
-              <a:rPr lang="en-US" dirty="0"/>
+              <a:rPr lang="en-US" dirty="0">
+                <a:solidFill>
+                  <a:srgbClr val="5A78AC"/>
+                </a:solidFill>
+              </a:rPr>
               <a:t> shell</a:t>
             </a:r>
           </a:p>
           <a:p>
             <a:pPr lvl="1"/>
             <a:r>
-              <a:rPr lang="en-US" dirty="0" err="1"/>
+              <a:rPr lang="en-US" dirty="0" err="1">
+                <a:solidFill>
+                  <a:srgbClr val="5A78AC"/>
+                </a:solidFill>
+              </a:rPr>
               <a:t>Supervisord</a:t>
             </a:r>
-            <a:endParaRPr lang="en-US" dirty="0"/>
+            <a:endParaRPr lang="en-US" dirty="0">
+              <a:solidFill>
+                <a:srgbClr val="5A78AC"/>
+              </a:solidFill>
+            </a:endParaRPr>
+          </a:p>
+        </p:txBody>
+      </p:sp>
+      <p:sp>
+        <p:nvSpPr>
+          <p:cNvPr id="4" name="Content Placeholder 3">
+            <a:extLst>
+              <a:ext uri="{FF2B5EF4-FFF2-40B4-BE49-F238E27FC236}">
+                <a16:creationId xmlns:a16="http://schemas.microsoft.com/office/drawing/2014/main" id="{C8E6DA52-FA9A-6B6C-D92B-F3843DBF143B}"/>
+              </a:ext>
+            </a:extLst>
+          </p:cNvPr>
+          <p:cNvSpPr>
+            <a:spLocks noGrp="1"/>
+          </p:cNvSpPr>
+          <p:nvPr>
+            <p:ph sz="half" idx="2"/>
+          </p:nvPr>
+        </p:nvSpPr>
+        <p:spPr/>
+        <p:txBody>
+          <a:bodyPr/>
+          <a:lstStyle/>
+          <a:p>
+            <a:r>
+              <a:rPr lang="en-US" dirty="0">
+                <a:solidFill>
+                  <a:srgbClr val="5A78AC"/>
+                </a:solidFill>
+              </a:rPr>
+              <a:t>DIAGRAMMES UML</a:t>
+            </a:r>
           </a:p>
           <a:p>
             <a:pPr lvl="1"/>
             <a:r>
-              <a:rPr lang="en-US" dirty="0" err="1"/>
-              <a:t>Monit</a:t>
-            </a:r>
-            <a:endParaRPr lang="en-US" dirty="0"/>
+              <a:rPr lang="en-US" dirty="0" err="1">
+                <a:solidFill>
+                  <a:srgbClr val="5A78AC"/>
+                </a:solidFill>
+              </a:rPr>
+              <a:t>Diagramme</a:t>
+            </a:r>
+            <a:r>
+              <a:rPr lang="en-US" dirty="0">
+                <a:solidFill>
+                  <a:srgbClr val="5A78AC"/>
+                </a:solidFill>
+              </a:rPr>
+              <a:t> de </a:t>
+            </a:r>
+            <a:r>
+              <a:rPr lang="en-US" dirty="0" err="1">
+                <a:solidFill>
+                  <a:srgbClr val="5A78AC"/>
+                </a:solidFill>
+              </a:rPr>
+              <a:t>cas</a:t>
+            </a:r>
+            <a:r>
+              <a:rPr lang="en-US" dirty="0">
+                <a:solidFill>
+                  <a:srgbClr val="5A78AC"/>
+                </a:solidFill>
+              </a:rPr>
+              <a:t> </a:t>
+            </a:r>
+            <a:r>
+              <a:rPr lang="en-US" dirty="0" err="1">
+                <a:solidFill>
+                  <a:srgbClr val="5A78AC"/>
+                </a:solidFill>
+              </a:rPr>
+              <a:t>d’utilisation</a:t>
+            </a:r>
+            <a:endParaRPr lang="en-US" dirty="0">
+              <a:solidFill>
+                <a:srgbClr val="5A78AC"/>
+              </a:solidFill>
+            </a:endParaRPr>
           </a:p>
           <a:p>
             <a:pPr lvl="1"/>
             <a:r>
-              <a:rPr lang="en-US" dirty="0"/>
-              <a:t>Glances</a:t>
-            </a:r>
-          </a:p>
-        </p:txBody>
-      </p:sp>
-      <p:sp>
-        <p:nvSpPr>
-          <p:cNvPr id="4" name="Content Placeholder 3">
-            <a:extLst>
-              <a:ext uri="{FF2B5EF4-FFF2-40B4-BE49-F238E27FC236}">
-                <a16:creationId xmlns:a16="http://schemas.microsoft.com/office/drawing/2014/main" id="{C8E6DA52-FA9A-6B6C-D92B-F3843DBF143B}"/>
-              </a:ext>
-            </a:extLst>
-          </p:cNvPr>
-          <p:cNvSpPr>
-            <a:spLocks noGrp="1"/>
-          </p:cNvSpPr>
-          <p:nvPr>
-            <p:ph sz="half" idx="2"/>
-          </p:nvPr>
-        </p:nvSpPr>
-        <p:spPr/>
-        <p:txBody>
-          <a:bodyPr/>
-          <a:lstStyle/>
-          <a:p>
-            <a:r>
-              <a:rPr lang="en-US" dirty="0"/>
-              <a:t>DIAGRAMMES UML</a:t>
-            </a:r>
-          </a:p>
-          <a:p>
-            <a:pPr lvl="1"/>
-            <a:r>
-              <a:rPr lang="en-US" dirty="0" err="1"/>
+              <a:rPr lang="en-US" dirty="0" err="1">
+                <a:solidFill>
+                  <a:srgbClr val="5A78AC"/>
+                </a:solidFill>
+              </a:rPr>
               <a:t>Diagramme</a:t>
             </a:r>
             <a:r>
-              <a:rPr lang="en-US" dirty="0"/>
+              <a:rPr lang="en-US" dirty="0">
+                <a:solidFill>
+                  <a:srgbClr val="5A78AC"/>
+                </a:solidFill>
+              </a:rPr>
               <a:t> de </a:t>
             </a:r>
             <a:r>
-              <a:rPr lang="en-US" dirty="0" err="1"/>
-              <a:t>cas</a:t>
-            </a:r>
-            <a:r>
-              <a:rPr lang="en-US" dirty="0"/>
-              <a:t> </a:t>
-            </a:r>
-            <a:r>
-              <a:rPr lang="en-US" dirty="0" err="1"/>
-              <a:t>d’utilisation</a:t>
-            </a:r>
-            <a:endParaRPr lang="en-US" dirty="0"/>
-          </a:p>
-          <a:p>
-            <a:pPr lvl="1"/>
-            <a:r>
-              <a:rPr lang="en-US" dirty="0" err="1"/>
-              <a:t>Diagramme</a:t>
-            </a:r>
-            <a:r>
-              <a:rPr lang="en-US" dirty="0"/>
-              <a:t> de </a:t>
-            </a:r>
-            <a:r>
-              <a:rPr lang="en-US" dirty="0" err="1"/>
+              <a:rPr lang="en-US" dirty="0" err="1">
+                <a:solidFill>
+                  <a:srgbClr val="5A78AC"/>
+                </a:solidFill>
+              </a:rPr>
               <a:t>classe</a:t>
             </a:r>
-            <a:endParaRPr lang="en-US" dirty="0"/>
-          </a:p>
-          <a:p>
-            <a:endParaRPr lang="en-US" dirty="0"/>
-          </a:p>
-          <a:p>
-            <a:endParaRPr lang="en-US" dirty="0"/>
-          </a:p>
-          <a:p>
-            <a:r>
-              <a:rPr lang="en-US" dirty="0"/>
+            <a:endParaRPr lang="en-US" dirty="0">
+              <a:solidFill>
+                <a:srgbClr val="5A78AC"/>
+              </a:solidFill>
+            </a:endParaRPr>
+          </a:p>
+          <a:p>
+            <a:endParaRPr lang="en-US" dirty="0">
+              <a:solidFill>
+                <a:srgbClr val="5A78AC"/>
+              </a:solidFill>
+            </a:endParaRPr>
+          </a:p>
+          <a:p>
+            <a:endParaRPr lang="en-US" dirty="0">
+              <a:solidFill>
+                <a:srgbClr val="5A78AC"/>
+              </a:solidFill>
+            </a:endParaRPr>
+          </a:p>
+          <a:p>
+            <a:r>
+              <a:rPr lang="en-US" dirty="0">
+                <a:solidFill>
+                  <a:srgbClr val="5A78AC"/>
+                </a:solidFill>
+              </a:rPr>
               <a:t>CONCLUSION</a:t>
             </a:r>
           </a:p>
@@ -4974,7 +5359,13 @@
           <a:lstStyle/>
           <a:p>
             <a:r>
-              <a:rPr lang="en-US" dirty="0"/>
+              <a:rPr lang="en-US" dirty="0">
+                <a:solidFill>
+                  <a:srgbClr val="5A78AC"/>
+                </a:solidFill>
+                <a:latin typeface="Poppins SemiBold" panose="00000700000000000000" pitchFamily="2" charset="0"/>
+                <a:cs typeface="Poppins SemiBold" panose="00000700000000000000" pitchFamily="2" charset="0"/>
+              </a:rPr>
               <a:t>INTRODUCTION</a:t>
             </a:r>
           </a:p>
@@ -4998,38 +5389,40 @@
         </p:nvSpPr>
         <p:spPr/>
         <p:txBody>
-          <a:bodyPr/>
-          <a:lstStyle/>
-          <a:p>
-            <a:r>
-              <a:rPr lang="en-US" dirty="0"/>
-              <a:t>Our application, </a:t>
-            </a:r>
-            <a:r>
-              <a:rPr lang="en-US" dirty="0" err="1"/>
+          <a:bodyPr>
+            <a:normAutofit lnSpcReduction="10000"/>
+          </a:bodyPr>
+          <a:lstStyle/>
+          <a:p>
+            <a:r>
+              <a:rPr lang="fr-FR" dirty="0"/>
+              <a:t>Notre application, </a:t>
+            </a:r>
+            <a:r>
+              <a:rPr lang="fr-FR" dirty="0" err="1"/>
               <a:t>TaskMan</a:t>
             </a:r>
             <a:r>
-              <a:rPr lang="en-US" dirty="0"/>
-              <a:t>, aims to provide Linux users with a comprehensive, user-friendly tool akin to the Windows Task Manager.</a:t>
-            </a:r>
-          </a:p>
-          <a:p>
-            <a:endParaRPr lang="en-US" dirty="0"/>
-          </a:p>
-          <a:p>
-            <a:r>
-              <a:rPr lang="en-US" dirty="0"/>
-              <a:t>This application will allow users to monitor system resources, manage running processes and control services with ease.</a:t>
-            </a:r>
-          </a:p>
-          <a:p>
-            <a:endParaRPr lang="en-US" dirty="0"/>
-          </a:p>
-          <a:p>
-            <a:r>
-              <a:rPr lang="en-US" dirty="0"/>
-              <a:t>The application is intended for Linux users such as; system administrators, developers, and novice users.</a:t>
+              <a:rPr lang="fr-FR" dirty="0"/>
+              <a:t>, vise à fournir aux utilisateurs de Linux un outil complet et convivial similaire au Gestionnaire des tâches de Windows.</a:t>
+            </a:r>
+          </a:p>
+          <a:p>
+            <a:endParaRPr lang="fr-FR" dirty="0"/>
+          </a:p>
+          <a:p>
+            <a:r>
+              <a:rPr lang="fr-FR" dirty="0"/>
+              <a:t>Cette application permettra aux utilisateurs de surveiller les ressources système, de gérer les processus en cours et de contrôler les services avec facilité.</a:t>
+            </a:r>
+          </a:p>
+          <a:p>
+            <a:endParaRPr lang="fr-FR" dirty="0"/>
+          </a:p>
+          <a:p>
+            <a:r>
+              <a:rPr lang="fr-FR" dirty="0"/>
+              <a:t>L'application est destinée aux utilisateurs de Linux tels que : les administrateurs système, les développeurs et les utilisateurs novices.</a:t>
             </a:r>
           </a:p>
           <a:p>
@@ -5089,7 +5482,13 @@
           <a:lstStyle/>
           <a:p>
             <a:r>
-              <a:rPr lang="en-US" dirty="0"/>
+              <a:rPr lang="en-US" dirty="0">
+                <a:solidFill>
+                  <a:srgbClr val="5A78AC"/>
+                </a:solidFill>
+                <a:latin typeface="Poppins SemiBold" panose="00000700000000000000" pitchFamily="2" charset="0"/>
+                <a:cs typeface="Poppins SemiBold" panose="00000700000000000000" pitchFamily="2" charset="0"/>
+              </a:rPr>
               <a:t>INTRODUCTION</a:t>
             </a:r>
           </a:p>
@@ -5117,53 +5516,42 @@
           <a:lstStyle/>
           <a:p>
             <a:r>
-              <a:rPr lang="en-US" dirty="0"/>
-              <a:t>The primary objectives of the application are</a:t>
+              <a:rPr lang="fr-FR" dirty="0"/>
+              <a:t>Les principaux objectifs de l'application sont</a:t>
             </a:r>
           </a:p>
           <a:p>
             <a:pPr lvl="1"/>
             <a:r>
-              <a:rPr lang="en-US" dirty="0"/>
-              <a:t>Simplify process management</a:t>
-            </a:r>
-          </a:p>
-          <a:p>
-            <a:pPr marL="457200" lvl="1" indent="0">
-              <a:buNone/>
-            </a:pPr>
-            <a:endParaRPr lang="en-US" dirty="0"/>
-          </a:p>
-          <a:p>
-            <a:pPr marL="457200" lvl="1" indent="0">
-              <a:buNone/>
-            </a:pPr>
-            <a:endParaRPr lang="en-US" dirty="0"/>
+              <a:rPr lang="fr-FR" dirty="0"/>
+              <a:t>Simplifiez la gestion des processus</a:t>
+            </a:r>
+          </a:p>
+          <a:p>
+            <a:endParaRPr lang="fr-FR" dirty="0"/>
+          </a:p>
+          <a:p>
+            <a:endParaRPr lang="fr-FR" dirty="0"/>
           </a:p>
           <a:p>
             <a:pPr lvl="1"/>
             <a:r>
-              <a:rPr lang="en-US" dirty="0"/>
-              <a:t>Control system services</a:t>
-            </a:r>
+              <a:rPr lang="fr-FR" dirty="0"/>
+              <a:t>Services de système de contrôle</a:t>
+            </a:r>
+          </a:p>
+          <a:p>
+            <a:endParaRPr lang="fr-FR" dirty="0"/>
+          </a:p>
+          <a:p>
+            <a:endParaRPr lang="fr-FR" dirty="0"/>
           </a:p>
           <a:p>
             <a:pPr lvl="1"/>
-            <a:endParaRPr lang="en-US" dirty="0"/>
-          </a:p>
-          <a:p>
-            <a:pPr lvl="1"/>
-            <a:endParaRPr lang="en-US" dirty="0"/>
-          </a:p>
-          <a:p>
-            <a:pPr lvl="1"/>
-            <a:r>
-              <a:rPr lang="en-US" dirty="0"/>
-              <a:t>Enhance system monitoring</a:t>
-            </a:r>
-          </a:p>
-          <a:p>
-            <a:pPr lvl="1"/>
+            <a:r>
+              <a:rPr lang="fr-FR" dirty="0"/>
+              <a:t>Améliorer la surveillance du système</a:t>
+            </a:r>
             <a:endParaRPr lang="en-US" dirty="0"/>
           </a:p>
         </p:txBody>
@@ -5220,7 +5608,13 @@
           <a:lstStyle/>
           <a:p>
             <a:r>
-              <a:rPr lang="en-US" dirty="0"/>
+              <a:rPr lang="en-US" dirty="0">
+                <a:solidFill>
+                  <a:srgbClr val="5A78AC"/>
+                </a:solidFill>
+                <a:latin typeface="Poppins SemiBold" panose="00000700000000000000" pitchFamily="2" charset="0"/>
+                <a:cs typeface="Poppins SemiBold" panose="00000700000000000000" pitchFamily="2" charset="0"/>
+              </a:rPr>
               <a:t>ETUDE DE L’EXISTANT</a:t>
             </a:r>
           </a:p>
@@ -5248,39 +5642,48 @@
           <a:lstStyle/>
           <a:p>
             <a:r>
-              <a:rPr lang="en-US" dirty="0"/>
-              <a:t>Existing solutions for process (task) management in Linux fall under 2 categories; shell commands and external programs</a:t>
-            </a:r>
-          </a:p>
-          <a:p>
+              <a:rPr lang="fr-FR" dirty="0"/>
+              <a:t>Les solutions existantes pour la gestion des processus (tâches) sous Linux se répartissent en 2 catégories : commandes </a:t>
+            </a:r>
+            <a:r>
+              <a:rPr lang="fr-FR" dirty="0" err="1"/>
+              <a:t>shell</a:t>
+            </a:r>
+            <a:r>
+              <a:rPr lang="fr-FR" dirty="0"/>
+              <a:t> et programmes externes</a:t>
+            </a:r>
+          </a:p>
+          <a:p>
+            <a:endParaRPr lang="fr-FR" dirty="0"/>
+          </a:p>
+          <a:p>
+            <a:r>
+              <a:rPr lang="fr-FR" dirty="0"/>
+              <a:t>Nous allons examiner chacun brièvement et nous concentrerons sur</a:t>
+            </a:r>
+          </a:p>
+          <a:p>
+            <a:pPr lvl="1"/>
+            <a:r>
+              <a:rPr lang="fr-FR" dirty="0"/>
+              <a:t>Comment les ressources sont surveillées</a:t>
+            </a:r>
+          </a:p>
+          <a:p>
+            <a:pPr lvl="1"/>
+            <a:r>
+              <a:rPr lang="fr-FR" dirty="0"/>
+              <a:t>Comment les services et les processus sont gérés</a:t>
+            </a:r>
+          </a:p>
+          <a:p>
+            <a:pPr lvl="1"/>
+            <a:r>
+              <a:rPr lang="fr-FR" dirty="0"/>
+              <a:t>Avantages et inconvénients</a:t>
+            </a:r>
             <a:endParaRPr lang="en-US" dirty="0"/>
-          </a:p>
-          <a:p>
-            <a:r>
-              <a:rPr lang="en-US" dirty="0"/>
-              <a:t>We are going to look at each one briefly were we will focus on</a:t>
-            </a:r>
-          </a:p>
-          <a:p>
-            <a:pPr lvl="1"/>
-            <a:r>
-              <a:rPr lang="en-US" dirty="0"/>
-              <a:t>How resources are monitored</a:t>
-            </a:r>
-          </a:p>
-          <a:p>
-            <a:pPr lvl="1"/>
-            <a:r>
-              <a:rPr lang="en-US" dirty="0"/>
-              <a:t>How services and processes are managed</a:t>
-            </a:r>
-          </a:p>
-          <a:p>
-            <a:pPr lvl="1"/>
-            <a:r>
-              <a:rPr lang="en-US" dirty="0"/>
-              <a:t>Advantages and disadvantages</a:t>
-            </a:r>
           </a:p>
         </p:txBody>
       </p:sp>
@@ -5336,9 +5739,36 @@
           <a:lstStyle/>
           <a:p>
             <a:r>
-              <a:rPr lang="en-US" dirty="0"/>
-              <a:t>ETUDE DE L’EXISTANT – Shell commands</a:t>
-            </a:r>
+              <a:rPr lang="en-US" dirty="0">
+                <a:solidFill>
+                  <a:srgbClr val="5A78AC"/>
+                </a:solidFill>
+                <a:latin typeface="Poppins SemiBold" panose="00000700000000000000" pitchFamily="2" charset="0"/>
+                <a:cs typeface="Poppins SemiBold" panose="00000700000000000000" pitchFamily="2" charset="0"/>
+              </a:rPr>
+              <a:t>ETUDE DE L’EXISTANT – </a:t>
+            </a:r>
+            <a:r>
+              <a:rPr lang="en-US" dirty="0" err="1">
+                <a:solidFill>
+                  <a:srgbClr val="5A78AC"/>
+                </a:solidFill>
+                <a:latin typeface="Poppins SemiBold" panose="00000700000000000000" pitchFamily="2" charset="0"/>
+                <a:cs typeface="Poppins SemiBold" panose="00000700000000000000" pitchFamily="2" charset="0"/>
+              </a:rPr>
+              <a:t>Commandes</a:t>
+            </a:r>
+            <a:r>
+              <a:rPr lang="en-US" dirty="0">
+                <a:solidFill>
+                  <a:srgbClr val="5A78AC"/>
+                </a:solidFill>
+                <a:latin typeface="Poppins SemiBold" panose="00000700000000000000" pitchFamily="2" charset="0"/>
+                <a:cs typeface="Poppins SemiBold" panose="00000700000000000000" pitchFamily="2" charset="0"/>
+              </a:rPr>
+              <a:t> shell</a:t>
+            </a:r>
+            <a:endParaRPr lang="en-US" dirty="0"/>
           </a:p>
         </p:txBody>
       </p:sp>
@@ -5364,18 +5794,35 @@
           <a:lstStyle/>
           <a:p>
             <a:r>
-              <a:rPr lang="en-US" dirty="0"/>
-              <a:t>Linux provides several shell commands that help in process management.</a:t>
-            </a:r>
-          </a:p>
-          <a:p>
+              <a:rPr lang="fr-FR" dirty="0"/>
+              <a:t>Linux fournit plusieurs commandes </a:t>
+            </a:r>
+            <a:r>
+              <a:rPr lang="fr-FR" dirty="0" err="1"/>
+              <a:t>shell</a:t>
+            </a:r>
+            <a:r>
+              <a:rPr lang="fr-FR" dirty="0"/>
+              <a:t> qui facilitent la gestion des processus.</a:t>
+            </a:r>
+          </a:p>
+          <a:p>
+            <a:endParaRPr lang="fr-FR" dirty="0"/>
+          </a:p>
+          <a:p>
+            <a:r>
+              <a:rPr lang="fr-FR" dirty="0"/>
+              <a:t>Le tableau suivant montre les différentes commandes </a:t>
+            </a:r>
+            <a:r>
+              <a:rPr lang="fr-FR" dirty="0" err="1"/>
+              <a:t>shell</a:t>
+            </a:r>
+            <a:r>
+              <a:rPr lang="fr-FR" dirty="0"/>
+              <a:t> qui nous permettent de gérer les processus sous Linux.</a:t>
+            </a:r>
             <a:endParaRPr lang="en-US" dirty="0"/>
-          </a:p>
-          <a:p>
-            <a:r>
-              <a:rPr lang="en-US" dirty="0"/>
-              <a:t>The following table shows the different shell commands that permit us to handle processes in Linux.</a:t>
-            </a:r>
           </a:p>
         </p:txBody>
       </p:sp>
@@ -5431,9 +5878,36 @@
           <a:lstStyle/>
           <a:p>
             <a:r>
-              <a:rPr lang="en-US" dirty="0"/>
-              <a:t>ETUDE DE L’EXISTANT – Shell commands</a:t>
-            </a:r>
+              <a:rPr lang="en-US" dirty="0">
+                <a:solidFill>
+                  <a:srgbClr val="5A78AC"/>
+                </a:solidFill>
+                <a:latin typeface="Poppins SemiBold" panose="00000700000000000000" pitchFamily="2" charset="0"/>
+                <a:cs typeface="Poppins SemiBold" panose="00000700000000000000" pitchFamily="2" charset="0"/>
+              </a:rPr>
+              <a:t>ETUDE DE L’EXISTANT – </a:t>
+            </a:r>
+            <a:r>
+              <a:rPr lang="en-US" dirty="0" err="1">
+                <a:solidFill>
+                  <a:srgbClr val="5A78AC"/>
+                </a:solidFill>
+                <a:latin typeface="Poppins SemiBold" panose="00000700000000000000" pitchFamily="2" charset="0"/>
+                <a:cs typeface="Poppins SemiBold" panose="00000700000000000000" pitchFamily="2" charset="0"/>
+              </a:rPr>
+              <a:t>Commandes</a:t>
+            </a:r>
+            <a:r>
+              <a:rPr lang="en-US" dirty="0">
+                <a:solidFill>
+                  <a:srgbClr val="5A78AC"/>
+                </a:solidFill>
+                <a:latin typeface="Poppins SemiBold" panose="00000700000000000000" pitchFamily="2" charset="0"/>
+                <a:cs typeface="Poppins SemiBold" panose="00000700000000000000" pitchFamily="2" charset="0"/>
+              </a:rPr>
+              <a:t> shell</a:t>
+            </a:r>
+            <a:endParaRPr lang="en-US" dirty="0"/>
           </a:p>
         </p:txBody>
       </p:sp>
@@ -5453,13 +5927,13 @@
             <p:ph idx="1"/>
             <p:extLst>
               <p:ext uri="{D42A27DB-BD31-4B8C-83A1-F6EECF244321}">
-                <p14:modId xmlns:p14="http://schemas.microsoft.com/office/powerpoint/2010/main" val="2676908373"/>
+                <p14:modId xmlns:p14="http://schemas.microsoft.com/office/powerpoint/2010/main" val="1249924733"/>
               </p:ext>
             </p:extLst>
           </p:nvPr>
         </p:nvGraphicFramePr>
         <p:xfrm>
-          <a:off x="838200" y="1383665"/>
+          <a:off x="838200" y="1688465"/>
           <a:ext cx="10515597" cy="4577080"/>
         </p:xfrm>
         <a:graphic>
@@ -5498,9 +5972,10 @@
                     <a:lstStyle/>
                     <a:p>
                       <a:r>
-                        <a:rPr lang="en-US" dirty="0"/>
-                        <a:t>Function</a:t>
-                      </a:r>
+                        <a:rPr lang="en-US" dirty="0" err="1"/>
+                        <a:t>Fonction</a:t>
+                      </a:r>
+                      <a:endParaRPr lang="en-US" dirty="0"/>
                     </a:p>
                   </a:txBody>
                   <a:tcPr/>
@@ -5511,9 +5986,10 @@
                     <a:lstStyle/>
                     <a:p>
                       <a:r>
-                        <a:rPr lang="en-US" dirty="0"/>
-                        <a:t>Tools</a:t>
-                      </a:r>
+                        <a:rPr lang="en-US" dirty="0" err="1"/>
+                        <a:t>Outils</a:t>
+                      </a:r>
+                      <a:endParaRPr lang="en-US" dirty="0"/>
                     </a:p>
                   </a:txBody>
                   <a:tcPr/>
@@ -5524,9 +6000,10 @@
                     <a:lstStyle/>
                     <a:p>
                       <a:r>
-                        <a:rPr lang="en-US" dirty="0"/>
-                        <a:t>Commands</a:t>
-                      </a:r>
+                        <a:rPr lang="en-US" dirty="0" err="1"/>
+                        <a:t>Commandes</a:t>
+                      </a:r>
+                      <a:endParaRPr lang="en-US" dirty="0"/>
                     </a:p>
                   </a:txBody>
                   <a:tcPr/>
@@ -5545,8 +6022,13 @@
                     <a:p>
                       <a:r>
                         <a:rPr lang="en-US" sz="2400" dirty="0"/>
-                        <a:t>Resource Monitoring</a:t>
-                      </a:r>
+                        <a:t>Surveillance des </a:t>
+                      </a:r>
+                      <a:r>
+                        <a:rPr lang="en-US" sz="2400" dirty="0" err="1"/>
+                        <a:t>ressources</a:t>
+                      </a:r>
+                      <a:endParaRPr lang="en-US" sz="2400" dirty="0"/>
                     </a:p>
                   </a:txBody>
                   <a:tcPr/>
@@ -5647,7 +6129,7 @@
                     <a:p>
                       <a:r>
                         <a:rPr lang="en-US" sz="2400" dirty="0"/>
-                        <a:t>Process Management</a:t>
+                        <a:t>Gestion des processus</a:t>
                       </a:r>
                     </a:p>
                   </a:txBody>
@@ -5822,9 +6304,36 @@
           <a:lstStyle/>
           <a:p>
             <a:r>
-              <a:rPr lang="en-US" dirty="0"/>
-              <a:t>ETUDE DE L’EXISTANT – Shell commands</a:t>
-            </a:r>
+              <a:rPr lang="en-US" dirty="0">
+                <a:solidFill>
+                  <a:srgbClr val="5A78AC"/>
+                </a:solidFill>
+                <a:latin typeface="Poppins SemiBold" panose="00000700000000000000" pitchFamily="2" charset="0"/>
+                <a:cs typeface="Poppins SemiBold" panose="00000700000000000000" pitchFamily="2" charset="0"/>
+              </a:rPr>
+              <a:t>ETUDE DE L’EXISTANT – </a:t>
+            </a:r>
+            <a:r>
+              <a:rPr lang="en-US" dirty="0" err="1">
+                <a:solidFill>
+                  <a:srgbClr val="5A78AC"/>
+                </a:solidFill>
+                <a:latin typeface="Poppins SemiBold" panose="00000700000000000000" pitchFamily="2" charset="0"/>
+                <a:cs typeface="Poppins SemiBold" panose="00000700000000000000" pitchFamily="2" charset="0"/>
+              </a:rPr>
+              <a:t>Commandes</a:t>
+            </a:r>
+            <a:r>
+              <a:rPr lang="en-US" dirty="0">
+                <a:solidFill>
+                  <a:srgbClr val="5A78AC"/>
+                </a:solidFill>
+                <a:latin typeface="Poppins SemiBold" panose="00000700000000000000" pitchFamily="2" charset="0"/>
+                <a:cs typeface="Poppins SemiBold" panose="00000700000000000000" pitchFamily="2" charset="0"/>
+              </a:rPr>
+              <a:t> shell</a:t>
+            </a:r>
+            <a:endParaRPr lang="en-US" dirty="0"/>
           </a:p>
         </p:txBody>
       </p:sp>
@@ -5844,7 +6353,7 @@
             <p:ph idx="1"/>
             <p:extLst>
               <p:ext uri="{D42A27DB-BD31-4B8C-83A1-F6EECF244321}">
-                <p14:modId xmlns:p14="http://schemas.microsoft.com/office/powerpoint/2010/main" val="2742139266"/>
+                <p14:modId xmlns:p14="http://schemas.microsoft.com/office/powerpoint/2010/main" val="1583079730"/>
               </p:ext>
             </p:extLst>
           </p:nvPr>
@@ -5936,7 +6445,7 @@
                     <a:p>
                       <a:r>
                         <a:rPr lang="en-US" sz="2400" dirty="0"/>
-                        <a:t>Service Management</a:t>
+                        <a:t>Gestion des services</a:t>
                       </a:r>
                     </a:p>
                   </a:txBody>
@@ -6122,9 +6631,36 @@
           <a:lstStyle/>
           <a:p>
             <a:r>
-              <a:rPr lang="en-US" dirty="0"/>
-              <a:t>ETUDE DE L’EXISTANT – Shell commands</a:t>
-            </a:r>
+              <a:rPr lang="en-US" dirty="0">
+                <a:solidFill>
+                  <a:srgbClr val="5A78AC"/>
+                </a:solidFill>
+                <a:latin typeface="Poppins SemiBold" panose="00000700000000000000" pitchFamily="2" charset="0"/>
+                <a:cs typeface="Poppins SemiBold" panose="00000700000000000000" pitchFamily="2" charset="0"/>
+              </a:rPr>
+              <a:t>ETUDE DE L’EXISTANT – </a:t>
+            </a:r>
+            <a:r>
+              <a:rPr lang="en-US" dirty="0" err="1">
+                <a:solidFill>
+                  <a:srgbClr val="5A78AC"/>
+                </a:solidFill>
+                <a:latin typeface="Poppins SemiBold" panose="00000700000000000000" pitchFamily="2" charset="0"/>
+                <a:cs typeface="Poppins SemiBold" panose="00000700000000000000" pitchFamily="2" charset="0"/>
+              </a:rPr>
+              <a:t>Commandes</a:t>
+            </a:r>
+            <a:r>
+              <a:rPr lang="en-US" dirty="0">
+                <a:solidFill>
+                  <a:srgbClr val="5A78AC"/>
+                </a:solidFill>
+                <a:latin typeface="Poppins SemiBold" panose="00000700000000000000" pitchFamily="2" charset="0"/>
+                <a:cs typeface="Poppins SemiBold" panose="00000700000000000000" pitchFamily="2" charset="0"/>
+              </a:rPr>
+              <a:t> shell</a:t>
+            </a:r>
+            <a:endParaRPr lang="en-US" dirty="0"/>
           </a:p>
         </p:txBody>
       </p:sp>
@@ -6146,53 +6682,53 @@
         </p:nvSpPr>
         <p:spPr/>
         <p:txBody>
-          <a:bodyPr/>
-          <a:lstStyle/>
-          <a:p>
-            <a:r>
-              <a:rPr lang="en-US" dirty="0"/>
-              <a:t>Advantages</a:t>
+          <a:bodyPr>
+            <a:normAutofit lnSpcReduction="10000"/>
+          </a:bodyPr>
+          <a:lstStyle/>
+          <a:p>
+            <a:r>
+              <a:rPr lang="fr-FR" dirty="0"/>
+              <a:t>Avantages</a:t>
             </a:r>
           </a:p>
           <a:p>
             <a:pPr lvl="1"/>
             <a:r>
-              <a:rPr lang="en-US" dirty="0"/>
-              <a:t>Commands can be easily scripted enabling automation.</a:t>
-            </a:r>
+              <a:rPr lang="fr-FR" dirty="0"/>
+              <a:t>Les commandes peuvent être facilement scriptées, permettant l'automatisation.</a:t>
+            </a:r>
+          </a:p>
+          <a:p>
+            <a:endParaRPr lang="fr-FR" dirty="0"/>
           </a:p>
           <a:p>
             <a:pPr lvl="1"/>
+            <a:r>
+              <a:rPr lang="fr-FR" dirty="0"/>
+              <a:t>Les utilisateurs peuvent combiner des commandes pour répondre à des besoins spécifiques</a:t>
+            </a:r>
+          </a:p>
+          <a:p>
+            <a:endParaRPr lang="fr-FR" dirty="0"/>
+          </a:p>
+          <a:p>
+            <a:pPr lvl="1"/>
+            <a:r>
+              <a:rPr lang="fr-FR" dirty="0"/>
+              <a:t>Ils sont intégrés au système et fournissent une interface cohérente pour gérer les processus sur les systèmes distants.</a:t>
+            </a:r>
+          </a:p>
+          <a:p>
+            <a:endParaRPr lang="fr-FR" dirty="0"/>
+          </a:p>
+          <a:p>
+            <a:pPr lvl="1"/>
+            <a:r>
+              <a:rPr lang="fr-FR" dirty="0"/>
+              <a:t>Peut être exécuté à distance</a:t>
+            </a:r>
             <a:endParaRPr lang="en-US" dirty="0"/>
-          </a:p>
-          <a:p>
-            <a:pPr lvl="1"/>
-            <a:r>
-              <a:rPr lang="en-US" dirty="0"/>
-              <a:t>Users can combine commands to suit specific needs</a:t>
-            </a:r>
-          </a:p>
-          <a:p>
-            <a:pPr lvl="1"/>
-            <a:endParaRPr lang="en-US" dirty="0"/>
-          </a:p>
-          <a:p>
-            <a:pPr lvl="1"/>
-            <a:r>
-              <a:rPr lang="en-US" dirty="0"/>
-              <a:t>They are built into the system and provide a consistent interface for managing processes on remote systems.</a:t>
-            </a:r>
-          </a:p>
-          <a:p>
-            <a:pPr lvl="1"/>
-            <a:endParaRPr lang="en-US" dirty="0"/>
-          </a:p>
-          <a:p>
-            <a:pPr lvl="1"/>
-            <a:r>
-              <a:rPr lang="en-US" dirty="0"/>
-              <a:t>Can be executed remotely</a:t>
-            </a:r>
           </a:p>
         </p:txBody>
       </p:sp>

</xml_diff>